<commit_message>
[docs] updated presentation and [results] from free web templates
</commit_message>
<xml_diff>
--- a/docs/Machine Language Generation.pptx
+++ b/docs/Machine Language Generation.pptx
@@ -500,7 +500,8 @@
           <a:p>
             <a:fld id="{D9A91621-9C70-4004-BFEA-DFD6F232913B}" type="datetimeFigureOut">
               <a:rPr lang="en-US" smtClean="0"/>
-              <a:t>4/28/2009</a:t>
+              <a:pPr/>
+              <a:t>4/29/2009</a:t>
             </a:fld>
             <a:endParaRPr lang="en-US"/>
           </a:p>
@@ -542,6 +543,7 @@
           <a:p>
             <a:fld id="{BC708E07-43E8-4598-9068-8E9ACAEEA03C}" type="slidenum">
               <a:rPr lang="en-US" smtClean="0"/>
+              <a:pPr/>
               <a:t>‹#›</a:t>
             </a:fld>
             <a:endParaRPr lang="en-US"/>
@@ -665,7 +667,8 @@
           <a:p>
             <a:fld id="{D9A91621-9C70-4004-BFEA-DFD6F232913B}" type="datetimeFigureOut">
               <a:rPr lang="en-US" smtClean="0"/>
-              <a:t>4/28/2009</a:t>
+              <a:pPr/>
+              <a:t>4/29/2009</a:t>
             </a:fld>
             <a:endParaRPr lang="en-US"/>
           </a:p>
@@ -707,6 +710,7 @@
           <a:p>
             <a:fld id="{BC708E07-43E8-4598-9068-8E9ACAEEA03C}" type="slidenum">
               <a:rPr lang="en-US" smtClean="0"/>
+              <a:pPr/>
               <a:t>‹#›</a:t>
             </a:fld>
             <a:endParaRPr lang="en-US"/>
@@ -840,7 +844,8 @@
           <a:p>
             <a:fld id="{D9A91621-9C70-4004-BFEA-DFD6F232913B}" type="datetimeFigureOut">
               <a:rPr lang="en-US" smtClean="0"/>
-              <a:t>4/28/2009</a:t>
+              <a:pPr/>
+              <a:t>4/29/2009</a:t>
             </a:fld>
             <a:endParaRPr lang="en-US"/>
           </a:p>
@@ -882,6 +887,7 @@
           <a:p>
             <a:fld id="{BC708E07-43E8-4598-9068-8E9ACAEEA03C}" type="slidenum">
               <a:rPr lang="en-US" smtClean="0"/>
+              <a:pPr/>
               <a:t>‹#›</a:t>
             </a:fld>
             <a:endParaRPr lang="en-US"/>
@@ -1009,7 +1015,8 @@
           <a:p>
             <a:fld id="{D9A91621-9C70-4004-BFEA-DFD6F232913B}" type="datetimeFigureOut">
               <a:rPr lang="en-US" smtClean="0"/>
-              <a:t>4/28/2009</a:t>
+              <a:pPr/>
+              <a:t>4/29/2009</a:t>
             </a:fld>
             <a:endParaRPr lang="en-US"/>
           </a:p>
@@ -1051,6 +1058,7 @@
           <a:p>
             <a:fld id="{BC708E07-43E8-4598-9068-8E9ACAEEA03C}" type="slidenum">
               <a:rPr lang="en-US" smtClean="0"/>
+              <a:pPr/>
               <a:t>‹#›</a:t>
             </a:fld>
             <a:endParaRPr lang="en-US"/>
@@ -1464,7 +1472,8 @@
           <a:p>
             <a:fld id="{D9A91621-9C70-4004-BFEA-DFD6F232913B}" type="datetimeFigureOut">
               <a:rPr lang="en-US" smtClean="0"/>
-              <a:t>4/28/2009</a:t>
+              <a:pPr/>
+              <a:t>4/29/2009</a:t>
             </a:fld>
             <a:endParaRPr lang="en-US"/>
           </a:p>
@@ -1506,6 +1515,7 @@
           <a:p>
             <a:fld id="{BC708E07-43E8-4598-9068-8E9ACAEEA03C}" type="slidenum">
               <a:rPr lang="en-US" smtClean="0"/>
+              <a:pPr/>
               <a:t>‹#›</a:t>
             </a:fld>
             <a:endParaRPr lang="en-US"/>
@@ -1728,7 +1738,8 @@
           <a:p>
             <a:fld id="{D9A91621-9C70-4004-BFEA-DFD6F232913B}" type="datetimeFigureOut">
               <a:rPr lang="en-US" smtClean="0"/>
-              <a:t>4/28/2009</a:t>
+              <a:pPr/>
+              <a:t>4/29/2009</a:t>
             </a:fld>
             <a:endParaRPr lang="en-US"/>
           </a:p>
@@ -1770,6 +1781,7 @@
           <a:p>
             <a:fld id="{BC708E07-43E8-4598-9068-8E9ACAEEA03C}" type="slidenum">
               <a:rPr lang="en-US" smtClean="0"/>
+              <a:pPr/>
               <a:t>‹#›</a:t>
             </a:fld>
             <a:endParaRPr lang="en-US"/>
@@ -2102,7 +2114,8 @@
           <a:p>
             <a:fld id="{D9A91621-9C70-4004-BFEA-DFD6F232913B}" type="datetimeFigureOut">
               <a:rPr lang="en-US" smtClean="0"/>
-              <a:t>4/28/2009</a:t>
+              <a:pPr/>
+              <a:t>4/29/2009</a:t>
             </a:fld>
             <a:endParaRPr lang="en-US"/>
           </a:p>
@@ -2144,6 +2157,7 @@
           <a:p>
             <a:fld id="{BC708E07-43E8-4598-9068-8E9ACAEEA03C}" type="slidenum">
               <a:rPr lang="en-US" smtClean="0"/>
+              <a:pPr/>
               <a:t>‹#›</a:t>
             </a:fld>
             <a:endParaRPr lang="en-US"/>
@@ -2224,7 +2238,8 @@
           <a:p>
             <a:fld id="{D9A91621-9C70-4004-BFEA-DFD6F232913B}" type="datetimeFigureOut">
               <a:rPr lang="en-US" smtClean="0"/>
-              <a:t>4/28/2009</a:t>
+              <a:pPr/>
+              <a:t>4/29/2009</a:t>
             </a:fld>
             <a:endParaRPr lang="en-US"/>
           </a:p>
@@ -2247,6 +2262,7 @@
           <a:p>
             <a:fld id="{BC708E07-43E8-4598-9068-8E9ACAEEA03C}" type="slidenum">
               <a:rPr lang="en-US" smtClean="0"/>
+              <a:pPr/>
               <a:t>‹#›</a:t>
             </a:fld>
             <a:endParaRPr lang="en-US"/>
@@ -2314,7 +2330,8 @@
           <a:p>
             <a:fld id="{D9A91621-9C70-4004-BFEA-DFD6F232913B}" type="datetimeFigureOut">
               <a:rPr lang="en-US" smtClean="0"/>
-              <a:t>4/28/2009</a:t>
+              <a:pPr/>
+              <a:t>4/29/2009</a:t>
             </a:fld>
             <a:endParaRPr lang="en-US"/>
           </a:p>
@@ -2356,6 +2373,7 @@
           <a:p>
             <a:fld id="{BC708E07-43E8-4598-9068-8E9ACAEEA03C}" type="slidenum">
               <a:rPr lang="en-US" smtClean="0"/>
+              <a:pPr/>
               <a:t>‹#›</a:t>
             </a:fld>
             <a:endParaRPr lang="en-US"/>
@@ -2563,7 +2581,8 @@
           <a:p>
             <a:fld id="{D9A91621-9C70-4004-BFEA-DFD6F232913B}" type="datetimeFigureOut">
               <a:rPr lang="en-US" smtClean="0"/>
-              <a:t>4/28/2009</a:t>
+              <a:pPr/>
+              <a:t>4/29/2009</a:t>
             </a:fld>
             <a:endParaRPr lang="en-US"/>
           </a:p>
@@ -2610,6 +2629,7 @@
           <a:p>
             <a:fld id="{BC708E07-43E8-4598-9068-8E9ACAEEA03C}" type="slidenum">
               <a:rPr lang="en-US" smtClean="0"/>
+              <a:pPr/>
               <a:t>‹#›</a:t>
             </a:fld>
             <a:endParaRPr lang="en-US"/>
@@ -2822,7 +2842,8 @@
           <a:p>
             <a:fld id="{D9A91621-9C70-4004-BFEA-DFD6F232913B}" type="datetimeFigureOut">
               <a:rPr lang="en-US" smtClean="0"/>
-              <a:t>4/28/2009</a:t>
+              <a:pPr/>
+              <a:t>4/29/2009</a:t>
             </a:fld>
             <a:endParaRPr lang="en-US"/>
           </a:p>
@@ -2864,6 +2885,7 @@
           <a:p>
             <a:fld id="{BC708E07-43E8-4598-9068-8E9ACAEEA03C}" type="slidenum">
               <a:rPr lang="en-US" smtClean="0"/>
+              <a:pPr/>
               <a:t>‹#›</a:t>
             </a:fld>
             <a:endParaRPr lang="en-US"/>
@@ -3226,7 +3248,8 @@
           <a:p>
             <a:fld id="{D9A91621-9C70-4004-BFEA-DFD6F232913B}" type="datetimeFigureOut">
               <a:rPr lang="en-US" smtClean="0"/>
-              <a:t>4/28/2009</a:t>
+              <a:pPr/>
+              <a:t>4/29/2009</a:t>
             </a:fld>
             <a:endParaRPr lang="en-US"/>
           </a:p>
@@ -3304,6 +3327,7 @@
           <a:p>
             <a:fld id="{BC708E07-43E8-4598-9068-8E9ACAEEA03C}" type="slidenum">
               <a:rPr lang="en-US" smtClean="0"/>
+              <a:pPr/>
               <a:t>‹#›</a:t>
             </a:fld>
             <a:endParaRPr lang="en-US"/>
@@ -3926,15 +3950,28 @@
             <a:pPr lvl="1"/>
             <a:r>
               <a:rPr lang="en-US" dirty="0" smtClean="0"/>
-              <a:t>Corpora doesn’t follow strict syllable count rules</a:t>
+              <a:t>Corpora </a:t>
+            </a:r>
+            <a:r>
+              <a:rPr lang="en-US" dirty="0" smtClean="0"/>
+              <a:t>do not </a:t>
+            </a:r>
+            <a:r>
+              <a:rPr lang="en-US" dirty="0" smtClean="0"/>
+              <a:t>follow strict syllable count rules</a:t>
             </a:r>
           </a:p>
           <a:p>
             <a:pPr lvl="1"/>
             <a:r>
               <a:rPr lang="en-US" dirty="0" smtClean="0"/>
-              <a:t>Too similar to Homework 2 (w/ keyword focus)</a:t>
-            </a:r>
+              <a:t>Too similar to Homework 2 </a:t>
+            </a:r>
+            <a:r>
+              <a:rPr lang="en-US" dirty="0" smtClean="0"/>
+              <a:t>(generation, keywords)</a:t>
+            </a:r>
+            <a:endParaRPr lang="en-US" dirty="0" smtClean="0"/>
           </a:p>
           <a:p>
             <a:r>
@@ -3946,8 +3983,13 @@
             <a:pPr lvl="1"/>
             <a:r>
               <a:rPr lang="en-US" dirty="0" smtClean="0"/>
-              <a:t>Difficult to evaluate semantics</a:t>
-            </a:r>
+              <a:t>Difficult to evaluate </a:t>
+            </a:r>
+            <a:r>
+              <a:rPr lang="en-US" dirty="0" smtClean="0"/>
+              <a:t>program semantics</a:t>
+            </a:r>
+            <a:endParaRPr lang="en-US" dirty="0" smtClean="0"/>
           </a:p>
           <a:p>
             <a:r>
@@ -3959,7 +4001,15 @@
             <a:pPr lvl="1"/>
             <a:r>
               <a:rPr lang="en-US" dirty="0" smtClean="0"/>
-              <a:t>Easy to evaluate: load in any browser!</a:t>
+              <a:t>Easy to evaluate: </a:t>
+            </a:r>
+            <a:r>
+              <a:rPr lang="en-US" dirty="0" smtClean="0"/>
+              <a:t>just load </a:t>
+            </a:r>
+            <a:r>
+              <a:rPr lang="en-US" dirty="0" smtClean="0"/>
+              <a:t>in any browser!</a:t>
             </a:r>
           </a:p>
           <a:p>
@@ -4048,27 +4098,17 @@
             <p:ph sz="half" idx="1"/>
           </p:nvPr>
         </p:nvSpPr>
-        <p:spPr/>
-        <p:txBody>
-          <a:bodyPr/>
-          <a:lstStyle/>
-          <a:p>
-            <a:pPr>
-              <a:buNone/>
-              <a:tabLst>
-                <a:tab pos="723900" algn="l"/>
-                <a:tab pos="1447800" algn="l"/>
-                <a:tab pos="2171700" algn="l"/>
-                <a:tab pos="2895600" algn="l"/>
-                <a:tab pos="3619500" algn="l"/>
-                <a:tab pos="4343400" algn="l"/>
-              </a:tabLst>
-            </a:pPr>
-            <a:r>
-              <a:rPr lang="en-US" sz="2800" dirty="0" smtClean="0"/>
-              <a:t>Simple Example:</a:t>
-            </a:r>
-          </a:p>
+        <p:spPr>
+          <a:xfrm>
+            <a:off x="457200" y="1600200"/>
+            <a:ext cx="5257800" cy="4525963"/>
+          </a:xfrm>
+        </p:spPr>
+        <p:txBody>
+          <a:bodyPr>
+            <a:normAutofit/>
+          </a:bodyPr>
+          <a:lstStyle/>
           <a:p>
             <a:pPr>
               <a:spcAft>
@@ -4095,11 +4135,7 @@
             </a:r>
             <a:r>
               <a:rPr lang="en-US" dirty="0" smtClean="0"/>
-              <a:t> NP </a:t>
-            </a:r>
-            <a:r>
-              <a:rPr lang="en-US" dirty="0" smtClean="0"/>
-              <a:t>VP</a:t>
+              <a:t> NP VP</a:t>
             </a:r>
           </a:p>
           <a:p>
@@ -4118,7 +4154,7 @@
             </a:pPr>
             <a:r>
               <a:rPr lang="en-US" dirty="0" smtClean="0"/>
-              <a:t>PP </a:t>
+              <a:t>NP </a:t>
             </a:r>
             <a:r>
               <a:rPr lang="en-US" dirty="0" smtClean="0">
@@ -4132,8 +4168,9 @@
             </a:r>
             <a:r>
               <a:rPr lang="en-US" dirty="0" smtClean="0"/>
-              <a:t>P NP</a:t>
-            </a:r>
+              <a:t>DET NN | NN</a:t>
+            </a:r>
+            <a:endParaRPr lang="en-US" dirty="0" smtClean="0"/>
           </a:p>
           <a:p>
             <a:pPr>
@@ -4161,11 +4198,11 @@
             </a:r>
             <a:r>
               <a:rPr lang="en-US" dirty="0" smtClean="0"/>
-              <a:t> </a:t>
-            </a:r>
-            <a:r>
-              <a:rPr lang="en-US" dirty="0" smtClean="0"/>
-              <a:t>V NP</a:t>
+              <a:t> V </a:t>
+            </a:r>
+            <a:r>
+              <a:rPr lang="en-US" dirty="0" smtClean="0"/>
+              <a:t>NP | V ADV</a:t>
             </a:r>
           </a:p>
           <a:p>
@@ -4184,7 +4221,7 @@
             </a:pPr>
             <a:r>
               <a:rPr lang="en-US" dirty="0" smtClean="0"/>
-              <a:t>VP </a:t>
+              <a:t>DET </a:t>
             </a:r>
             <a:r>
               <a:rPr lang="en-US" dirty="0" smtClean="0">
@@ -4194,12 +4231,13 @@
             </a:r>
             <a:r>
               <a:rPr lang="en-US" dirty="0" smtClean="0"/>
-              <a:t> </a:t>
-            </a:r>
-            <a:r>
-              <a:rPr lang="en-US" dirty="0" smtClean="0"/>
-              <a:t>VP PP</a:t>
-            </a:r>
+              <a:t> the | </a:t>
+            </a:r>
+            <a:r>
+              <a:rPr lang="en-US" dirty="0" smtClean="0"/>
+              <a:t>a | …</a:t>
+            </a:r>
+            <a:endParaRPr lang="en-US" dirty="0" smtClean="0"/>
           </a:p>
           <a:p>
             <a:pPr>
@@ -4217,7 +4255,7 @@
             </a:pPr>
             <a:r>
               <a:rPr lang="en-US" dirty="0" smtClean="0"/>
-              <a:t>P </a:t>
+              <a:t>NN </a:t>
             </a:r>
             <a:r>
               <a:rPr lang="en-US" dirty="0" smtClean="0">
@@ -4227,12 +4265,13 @@
             </a:r>
             <a:r>
               <a:rPr lang="en-US" dirty="0" smtClean="0"/>
-              <a:t> </a:t>
-            </a:r>
-            <a:r>
-              <a:rPr lang="en-US" dirty="0" smtClean="0"/>
-              <a:t>with</a:t>
-            </a:r>
+              <a:t> rabbit | </a:t>
+            </a:r>
+            <a:r>
+              <a:rPr lang="en-US" dirty="0" smtClean="0"/>
+              <a:t>man | …</a:t>
+            </a:r>
+            <a:endParaRPr lang="en-US" dirty="0" smtClean="0"/>
           </a:p>
           <a:p>
             <a:pPr>
@@ -4260,27 +4299,12 @@
             </a:r>
             <a:r>
               <a:rPr lang="en-US" dirty="0" smtClean="0"/>
-              <a:t> saw</a:t>
-            </a:r>
-            <a:endParaRPr lang="en-US" dirty="0" smtClean="0"/>
-          </a:p>
-        </p:txBody>
-      </p:sp>
-      <p:sp>
-        <p:nvSpPr>
-          <p:cNvPr id="4" name="Content Placeholder 3"/>
-          <p:cNvSpPr>
-            <a:spLocks noGrp="1"/>
-          </p:cNvSpPr>
-          <p:nvPr>
-            <p:ph sz="half" idx="2"/>
-          </p:nvPr>
-        </p:nvSpPr>
-        <p:spPr/>
-        <p:txBody>
-          <a:bodyPr/>
-          <a:lstStyle/>
-          <a:p>
+              <a:t> eats | </a:t>
+            </a:r>
+            <a:r>
+              <a:rPr lang="en-US" dirty="0" smtClean="0"/>
+              <a:t>runs | …</a:t>
+            </a:r>
             <a:endParaRPr lang="en-US" dirty="0" smtClean="0"/>
           </a:p>
           <a:p>
@@ -4299,7 +4323,7 @@
             </a:pPr>
             <a:r>
               <a:rPr lang="en-US" dirty="0" smtClean="0"/>
-              <a:t>NP </a:t>
+              <a:t>ADV </a:t>
             </a:r>
             <a:r>
               <a:rPr lang="en-US" dirty="0" smtClean="0">
@@ -4309,172 +4333,11 @@
             </a:r>
             <a:r>
               <a:rPr lang="en-US" dirty="0" smtClean="0"/>
-              <a:t> </a:t>
-            </a:r>
-            <a:r>
-              <a:rPr lang="en-US" dirty="0" smtClean="0"/>
-              <a:t>NP PP</a:t>
-            </a:r>
-          </a:p>
-          <a:p>
-            <a:pPr>
-              <a:spcAft>
-                <a:spcPts val="1138"/>
-              </a:spcAft>
-              <a:tabLst>
-                <a:tab pos="723900" algn="l"/>
-                <a:tab pos="1447800" algn="l"/>
-                <a:tab pos="2171700" algn="l"/>
-                <a:tab pos="2895600" algn="l"/>
-                <a:tab pos="3619500" algn="l"/>
-                <a:tab pos="4343400" algn="l"/>
-              </a:tabLst>
-            </a:pPr>
-            <a:r>
-              <a:rPr lang="en-US" dirty="0" smtClean="0"/>
-              <a:t>NP </a:t>
-            </a:r>
-            <a:r>
-              <a:rPr lang="en-US" dirty="0" smtClean="0">
-                <a:sym typeface="Wingdings" pitchFamily="2" charset="2"/>
-              </a:rPr>
-              <a:t></a:t>
-            </a:r>
-            <a:r>
-              <a:rPr lang="en-US" dirty="0" smtClean="0"/>
-              <a:t> </a:t>
-            </a:r>
-            <a:r>
-              <a:rPr lang="en-US" dirty="0" smtClean="0"/>
-              <a:t>astronomers</a:t>
-            </a:r>
-          </a:p>
-          <a:p>
-            <a:pPr>
-              <a:spcAft>
-                <a:spcPts val="1138"/>
-              </a:spcAft>
-              <a:tabLst>
-                <a:tab pos="723900" algn="l"/>
-                <a:tab pos="1447800" algn="l"/>
-                <a:tab pos="2171700" algn="l"/>
-                <a:tab pos="2895600" algn="l"/>
-                <a:tab pos="3619500" algn="l"/>
-                <a:tab pos="4343400" algn="l"/>
-              </a:tabLst>
-            </a:pPr>
-            <a:r>
-              <a:rPr lang="en-US" dirty="0" smtClean="0"/>
-              <a:t>NP </a:t>
-            </a:r>
-            <a:r>
-              <a:rPr lang="en-US" dirty="0" smtClean="0">
-                <a:sym typeface="Wingdings" pitchFamily="2" charset="2"/>
-              </a:rPr>
-              <a:t></a:t>
-            </a:r>
-            <a:r>
-              <a:rPr lang="en-US" dirty="0" smtClean="0"/>
-              <a:t> </a:t>
-            </a:r>
-            <a:r>
-              <a:rPr lang="en-US" dirty="0" smtClean="0"/>
-              <a:t>ears</a:t>
-            </a:r>
-          </a:p>
-          <a:p>
-            <a:pPr>
-              <a:spcAft>
-                <a:spcPts val="1138"/>
-              </a:spcAft>
-              <a:tabLst>
-                <a:tab pos="723900" algn="l"/>
-                <a:tab pos="1447800" algn="l"/>
-                <a:tab pos="2171700" algn="l"/>
-                <a:tab pos="2895600" algn="l"/>
-                <a:tab pos="3619500" algn="l"/>
-                <a:tab pos="4343400" algn="l"/>
-              </a:tabLst>
-            </a:pPr>
-            <a:r>
-              <a:rPr lang="en-US" dirty="0" smtClean="0"/>
-              <a:t>NP </a:t>
-            </a:r>
-            <a:r>
-              <a:rPr lang="en-US" dirty="0" smtClean="0">
-                <a:sym typeface="Wingdings" pitchFamily="2" charset="2"/>
-              </a:rPr>
-              <a:t></a:t>
-            </a:r>
-            <a:r>
-              <a:rPr lang="en-US" dirty="0" smtClean="0"/>
-              <a:t> </a:t>
-            </a:r>
-            <a:r>
-              <a:rPr lang="en-US" dirty="0" smtClean="0"/>
-              <a:t>saw</a:t>
-            </a:r>
-          </a:p>
-          <a:p>
-            <a:pPr>
-              <a:spcAft>
-                <a:spcPts val="1138"/>
-              </a:spcAft>
-              <a:tabLst>
-                <a:tab pos="723900" algn="l"/>
-                <a:tab pos="1447800" algn="l"/>
-                <a:tab pos="2171700" algn="l"/>
-                <a:tab pos="2895600" algn="l"/>
-                <a:tab pos="3619500" algn="l"/>
-                <a:tab pos="4343400" algn="l"/>
-              </a:tabLst>
-            </a:pPr>
-            <a:r>
-              <a:rPr lang="en-US" dirty="0" smtClean="0"/>
-              <a:t>NP </a:t>
-            </a:r>
-            <a:r>
-              <a:rPr lang="en-US" dirty="0" smtClean="0">
-                <a:sym typeface="Wingdings" pitchFamily="2" charset="2"/>
-              </a:rPr>
-              <a:t></a:t>
-            </a:r>
-            <a:r>
-              <a:rPr lang="en-US" dirty="0" smtClean="0"/>
-              <a:t> </a:t>
-            </a:r>
-            <a:r>
-              <a:rPr lang="en-US" dirty="0" smtClean="0"/>
-              <a:t>stars</a:t>
-            </a:r>
-          </a:p>
-          <a:p>
-            <a:pPr>
-              <a:spcAft>
-                <a:spcPts val="1138"/>
-              </a:spcAft>
-              <a:tabLst>
-                <a:tab pos="723900" algn="l"/>
-                <a:tab pos="1447800" algn="l"/>
-                <a:tab pos="2171700" algn="l"/>
-                <a:tab pos="2895600" algn="l"/>
-                <a:tab pos="3619500" algn="l"/>
-                <a:tab pos="4343400" algn="l"/>
-              </a:tabLst>
-            </a:pPr>
-            <a:r>
-              <a:rPr lang="en-US" dirty="0" smtClean="0"/>
-              <a:t>NP </a:t>
-            </a:r>
-            <a:r>
-              <a:rPr lang="en-US" dirty="0" smtClean="0">
-                <a:sym typeface="Wingdings" pitchFamily="2" charset="2"/>
-              </a:rPr>
-              <a:t></a:t>
-            </a:r>
-            <a:r>
-              <a:rPr lang="en-US" dirty="0" smtClean="0"/>
-              <a:t> telescopes</a:t>
+              <a:t> quickly | </a:t>
+            </a:r>
+            <a:r>
+              <a:rPr lang="en-US" dirty="0" smtClean="0"/>
+              <a:t>slowly | …</a:t>
             </a:r>
             <a:endParaRPr lang="en-US" dirty="0" smtClean="0"/>
           </a:p>
@@ -4536,7 +4399,15 @@
                   <a:schemeClr val="accent1"/>
                 </a:solidFill>
               </a:rPr>
-              <a:t>Probabilistic CFGs</a:t>
+              <a:t>Probabilistic </a:t>
+            </a:r>
+            <a:r>
+              <a:rPr lang="en-US" dirty="0" smtClean="0">
+                <a:solidFill>
+                  <a:schemeClr val="accent1"/>
+                </a:solidFill>
+              </a:rPr>
+              <a:t>CFG</a:t>
             </a:r>
             <a:endParaRPr lang="en-US" dirty="0">
               <a:solidFill>
@@ -4559,7 +4430,7 @@
         <p:spPr/>
         <p:txBody>
           <a:bodyPr>
-            <a:normAutofit fontScale="92500" lnSpcReduction="20000"/>
+            <a:normAutofit lnSpcReduction="10000"/>
           </a:bodyPr>
           <a:lstStyle/>
           <a:p>
@@ -4595,15 +4466,7 @@
                   <a:schemeClr val="accent2"/>
                 </a:solidFill>
               </a:rPr>
-              <a:t>&lt;/html</a:t>
-            </a:r>
-            <a:r>
-              <a:rPr lang="en-US" sz="3100" dirty="0" smtClean="0">
-                <a:solidFill>
-                  <a:schemeClr val="accent2"/>
-                </a:solidFill>
-              </a:rPr>
-              <a:t>&gt;</a:t>
+              <a:t>&lt;/html&gt;</a:t>
             </a:r>
           </a:p>
           <a:p>
@@ -4658,15 +4521,117 @@
                   <a:schemeClr val="accent2"/>
                 </a:solidFill>
               </a:rPr>
-              <a:t>&lt;/head&gt;</a:t>
+              <a:t>&lt;/</a:t>
+            </a:r>
+            <a:r>
+              <a:rPr lang="en-US" sz="3100" dirty="0" smtClean="0">
+                <a:solidFill>
+                  <a:schemeClr val="accent2"/>
+                </a:solidFill>
+              </a:rPr>
+              <a:t>head&gt;</a:t>
+            </a:r>
+          </a:p>
+          <a:p>
+            <a:pPr>
+              <a:spcAft>
+                <a:spcPts val="1138"/>
+              </a:spcAft>
+              <a:tabLst>
+                <a:tab pos="723900" algn="l"/>
+                <a:tab pos="1447800" algn="l"/>
+                <a:tab pos="2171700" algn="l"/>
+                <a:tab pos="2895600" algn="l"/>
+                <a:tab pos="3619500" algn="l"/>
+                <a:tab pos="4343400" algn="l"/>
+                <a:tab pos="5067300" algn="l"/>
+                <a:tab pos="5791200" algn="l"/>
+                <a:tab pos="6515100" algn="l"/>
+                <a:tab pos="7239000" algn="l"/>
+                <a:tab pos="7962900" algn="l"/>
+                <a:tab pos="8686800" algn="l"/>
+              </a:tabLst>
+            </a:pPr>
+            <a:r>
+              <a:rPr lang="en-US" sz="3100" dirty="0" smtClean="0"/>
+              <a:t>BODY </a:t>
+            </a:r>
+            <a:r>
+              <a:rPr lang="en-US" sz="3100" dirty="0" smtClean="0">
+                <a:sym typeface="Wingdings" pitchFamily="2" charset="2"/>
+              </a:rPr>
+              <a:t></a:t>
             </a:r>
             <a:r>
               <a:rPr lang="en-US" sz="3100" dirty="0" smtClean="0"/>
               <a:t> </a:t>
             </a:r>
             <a:r>
+              <a:rPr lang="en-US" sz="3100" dirty="0" smtClean="0">
+                <a:solidFill>
+                  <a:schemeClr val="accent2"/>
+                </a:solidFill>
+              </a:rPr>
+              <a:t>&lt;body&gt;</a:t>
+            </a:r>
+            <a:r>
               <a:rPr lang="en-US" sz="3100" dirty="0" smtClean="0"/>
-              <a:t>| </a:t>
+              <a:t> (BODYTEXT)* </a:t>
+            </a:r>
+            <a:r>
+              <a:rPr lang="en-US" sz="3100" dirty="0" smtClean="0">
+                <a:solidFill>
+                  <a:schemeClr val="accent2"/>
+                </a:solidFill>
+              </a:rPr>
+              <a:t>&lt;/body&gt;</a:t>
+            </a:r>
+          </a:p>
+          <a:p>
+            <a:pPr>
+              <a:spcAft>
+                <a:spcPts val="1138"/>
+              </a:spcAft>
+              <a:tabLst>
+                <a:tab pos="723900" algn="l"/>
+                <a:tab pos="1447800" algn="l"/>
+                <a:tab pos="2171700" algn="l"/>
+                <a:tab pos="2895600" algn="l"/>
+                <a:tab pos="3619500" algn="l"/>
+                <a:tab pos="4343400" algn="l"/>
+                <a:tab pos="5067300" algn="l"/>
+                <a:tab pos="5791200" algn="l"/>
+                <a:tab pos="6515100" algn="l"/>
+                <a:tab pos="7239000" algn="l"/>
+                <a:tab pos="7962900" algn="l"/>
+                <a:tab pos="8686800" algn="l"/>
+              </a:tabLst>
+            </a:pPr>
+            <a:r>
+              <a:rPr lang="en-US" sz="3100" dirty="0" smtClean="0"/>
+              <a:t>BODYTEXT </a:t>
+            </a:r>
+            <a:r>
+              <a:rPr lang="en-US" sz="3100" dirty="0" smtClean="0">
+                <a:sym typeface="Wingdings" pitchFamily="2" charset="2"/>
+              </a:rPr>
+              <a:t></a:t>
+            </a:r>
+            <a:r>
+              <a:rPr lang="en-US" sz="3100" dirty="0" smtClean="0"/>
+              <a:t> </a:t>
+            </a:r>
+            <a:r>
+              <a:rPr lang="en-US" sz="3100" dirty="0" smtClean="0"/>
+              <a:t>(IMG </a:t>
+            </a:r>
+            <a:r>
+              <a:rPr lang="en-US" sz="3100" dirty="0" smtClean="0"/>
+              <a:t>| A | P | B </a:t>
+            </a:r>
+            <a:r>
+              <a:rPr lang="en-US" sz="3100" dirty="0" smtClean="0"/>
+              <a:t>|</a:t>
             </a:r>
             <a:endParaRPr lang="en-US" sz="3100" dirty="0" smtClean="0"/>
           </a:p>
@@ -4693,44 +4658,13 @@
             </a:pPr>
             <a:r>
               <a:rPr lang="en-US" sz="3100" dirty="0" smtClean="0"/>
-              <a:t>                 </a:t>
-            </a:r>
-            <a:r>
-              <a:rPr lang="en-US" sz="3100" dirty="0" smtClean="0">
-                <a:solidFill>
-                  <a:schemeClr val="accent2"/>
-                </a:solidFill>
-              </a:rPr>
-              <a:t>&lt;</a:t>
-            </a:r>
-            <a:r>
-              <a:rPr lang="en-US" sz="3100" dirty="0" smtClean="0">
-                <a:solidFill>
-                  <a:schemeClr val="accent2"/>
-                </a:solidFill>
-              </a:rPr>
-              <a:t>meta&gt;</a:t>
+              <a:t>                          H1 | H2 | H3 | </a:t>
             </a:r>
             <a:r>
               <a:rPr lang="en-US" sz="3100" dirty="0" smtClean="0"/>
-              <a:t> META </a:t>
-            </a:r>
-            <a:r>
-              <a:rPr lang="en-US" sz="3100" dirty="0" smtClean="0">
-                <a:solidFill>
-                  <a:schemeClr val="accent2"/>
-                </a:solidFill>
-              </a:rPr>
-              <a:t>&lt;/meta</a:t>
-            </a:r>
-            <a:r>
-              <a:rPr lang="en-US" sz="3100" dirty="0" smtClean="0">
-                <a:solidFill>
-                  <a:schemeClr val="accent2"/>
-                </a:solidFill>
-              </a:rPr>
-              <a:t>&gt;</a:t>
-            </a:r>
+              <a:t>... )*</a:t>
+            </a:r>
+            <a:endParaRPr lang="en-US" sz="3100" dirty="0" smtClean="0"/>
           </a:p>
           <a:p>
             <a:pPr>
@@ -4754,7 +4688,7 @@
             </a:pPr>
             <a:r>
               <a:rPr lang="en-US" sz="3100" dirty="0" smtClean="0"/>
-              <a:t>BODY </a:t>
+              <a:t>P </a:t>
             </a:r>
             <a:r>
               <a:rPr lang="en-US" sz="3100" dirty="0" smtClean="0">
@@ -4772,7 +4706,7 @@
                   <a:schemeClr val="accent2"/>
                 </a:solidFill>
               </a:rPr>
-              <a:t>&lt;body&gt;</a:t>
+              <a:t>&lt;p&gt;</a:t>
             </a:r>
             <a:r>
               <a:rPr lang="en-US" sz="3100" dirty="0" smtClean="0"/>
@@ -4784,15 +4718,7 @@
                   <a:schemeClr val="accent2"/>
                 </a:solidFill>
               </a:rPr>
-              <a:t>&lt;/body</a:t>
-            </a:r>
-            <a:r>
-              <a:rPr lang="en-US" sz="3100" dirty="0" smtClean="0">
-                <a:solidFill>
-                  <a:schemeClr val="accent2"/>
-                </a:solidFill>
-              </a:rPr>
-              <a:t>&gt;</a:t>
+              <a:t>&lt;/p&gt;</a:t>
             </a:r>
           </a:p>
           <a:p>
@@ -4817,138 +4743,6 @@
             </a:pPr>
             <a:r>
               <a:rPr lang="en-US" sz="3100" dirty="0" smtClean="0"/>
-              <a:t>BODYTEXT </a:t>
-            </a:r>
-            <a:r>
-              <a:rPr lang="en-US" sz="3100" dirty="0" smtClean="0">
-                <a:sym typeface="Wingdings" pitchFamily="2" charset="2"/>
-              </a:rPr>
-              <a:t></a:t>
-            </a:r>
-            <a:r>
-              <a:rPr lang="en-US" sz="3100" dirty="0" smtClean="0"/>
-              <a:t> </a:t>
-            </a:r>
-            <a:r>
-              <a:rPr lang="en-US" sz="3100" dirty="0" smtClean="0"/>
-              <a:t>IMG | A | P | B </a:t>
-            </a:r>
-            <a:r>
-              <a:rPr lang="en-US" sz="3100" dirty="0" smtClean="0"/>
-              <a:t>|</a:t>
-            </a:r>
-          </a:p>
-          <a:p>
-            <a:pPr>
-              <a:spcAft>
-                <a:spcPts val="1138"/>
-              </a:spcAft>
-              <a:buNone/>
-              <a:tabLst>
-                <a:tab pos="723900" algn="l"/>
-                <a:tab pos="1447800" algn="l"/>
-                <a:tab pos="2171700" algn="l"/>
-                <a:tab pos="2895600" algn="l"/>
-                <a:tab pos="3619500" algn="l"/>
-                <a:tab pos="4343400" algn="l"/>
-                <a:tab pos="5067300" algn="l"/>
-                <a:tab pos="5791200" algn="l"/>
-                <a:tab pos="6515100" algn="l"/>
-                <a:tab pos="7239000" algn="l"/>
-                <a:tab pos="7962900" algn="l"/>
-                <a:tab pos="8686800" algn="l"/>
-              </a:tabLst>
-            </a:pPr>
-            <a:r>
-              <a:rPr lang="en-US" sz="3100" dirty="0" smtClean="0"/>
-              <a:t> </a:t>
-            </a:r>
-            <a:r>
-              <a:rPr lang="en-US" sz="3100" dirty="0" smtClean="0"/>
-              <a:t>                         H1 </a:t>
-            </a:r>
-            <a:r>
-              <a:rPr lang="en-US" sz="3100" dirty="0" smtClean="0"/>
-              <a:t>| H2 | H3 | ...</a:t>
-            </a:r>
-          </a:p>
-          <a:p>
-            <a:pPr>
-              <a:spcAft>
-                <a:spcPts val="1138"/>
-              </a:spcAft>
-              <a:tabLst>
-                <a:tab pos="723900" algn="l"/>
-                <a:tab pos="1447800" algn="l"/>
-                <a:tab pos="2171700" algn="l"/>
-                <a:tab pos="2895600" algn="l"/>
-                <a:tab pos="3619500" algn="l"/>
-                <a:tab pos="4343400" algn="l"/>
-                <a:tab pos="5067300" algn="l"/>
-                <a:tab pos="5791200" algn="l"/>
-                <a:tab pos="6515100" algn="l"/>
-                <a:tab pos="7239000" algn="l"/>
-                <a:tab pos="7962900" algn="l"/>
-                <a:tab pos="8686800" algn="l"/>
-              </a:tabLst>
-            </a:pPr>
-            <a:r>
-              <a:rPr lang="en-US" sz="3100" dirty="0" smtClean="0"/>
-              <a:t>P </a:t>
-            </a:r>
-            <a:r>
-              <a:rPr lang="en-US" sz="3100" dirty="0" smtClean="0">
-                <a:sym typeface="Wingdings" pitchFamily="2" charset="2"/>
-              </a:rPr>
-              <a:t></a:t>
-            </a:r>
-            <a:r>
-              <a:rPr lang="en-US" sz="3100" dirty="0" smtClean="0"/>
-              <a:t> </a:t>
-            </a:r>
-            <a:r>
-              <a:rPr lang="en-US" sz="3100" dirty="0" smtClean="0">
-                <a:solidFill>
-                  <a:schemeClr val="accent2"/>
-                </a:solidFill>
-              </a:rPr>
-              <a:t>&lt;p&gt;</a:t>
-            </a:r>
-            <a:r>
-              <a:rPr lang="en-US" sz="3100" dirty="0" smtClean="0"/>
-              <a:t> (BODYTEXT)* </a:t>
-            </a:r>
-            <a:r>
-              <a:rPr lang="en-US" sz="3100" dirty="0" smtClean="0">
-                <a:solidFill>
-                  <a:schemeClr val="accent2"/>
-                </a:solidFill>
-              </a:rPr>
-              <a:t>&lt;/p&gt;</a:t>
-            </a:r>
-          </a:p>
-          <a:p>
-            <a:pPr>
-              <a:spcAft>
-                <a:spcPts val="1138"/>
-              </a:spcAft>
-              <a:tabLst>
-                <a:tab pos="723900" algn="l"/>
-                <a:tab pos="1447800" algn="l"/>
-                <a:tab pos="2171700" algn="l"/>
-                <a:tab pos="2895600" algn="l"/>
-                <a:tab pos="3619500" algn="l"/>
-                <a:tab pos="4343400" algn="l"/>
-                <a:tab pos="5067300" algn="l"/>
-                <a:tab pos="5791200" algn="l"/>
-                <a:tab pos="6515100" algn="l"/>
-                <a:tab pos="7239000" algn="l"/>
-                <a:tab pos="7962900" algn="l"/>
-                <a:tab pos="8686800" algn="l"/>
-              </a:tabLst>
-            </a:pPr>
-            <a:r>
-              <a:rPr lang="en-US" sz="3100" dirty="0" smtClean="0"/>
               <a:t>H1 </a:t>
             </a:r>
             <a:r>
@@ -4979,21 +4773,8 @@
                   <a:schemeClr val="accent2"/>
                 </a:solidFill>
               </a:rPr>
-              <a:t>&lt;/h1</a:t>
-            </a:r>
-            <a:r>
-              <a:rPr lang="en-US" sz="3100" dirty="0" smtClean="0">
-                <a:solidFill>
-                  <a:schemeClr val="accent2"/>
-                </a:solidFill>
-              </a:rPr>
-              <a:t>&gt;</a:t>
-            </a:r>
-            <a:endParaRPr lang="en-US" sz="3100" dirty="0" smtClean="0">
-              <a:solidFill>
-                <a:schemeClr val="accent2"/>
-              </a:solidFill>
-            </a:endParaRPr>
+              <a:t>&lt;/h1&gt;</a:t>
+            </a:r>
           </a:p>
         </p:txBody>
       </p:sp>
@@ -5319,7 +5100,7 @@
         <p:spPr/>
         <p:txBody>
           <a:bodyPr>
-            <a:normAutofit lnSpcReduction="10000"/>
+            <a:normAutofit/>
           </a:bodyPr>
           <a:lstStyle/>
           <a:p>
@@ -5332,28 +5113,28 @@
             <a:pPr lvl="1"/>
             <a:r>
               <a:rPr lang="en-US" dirty="0" smtClean="0"/>
-              <a:t>script, style, meta, link, </a:t>
-            </a:r>
-            <a:r>
-              <a:rPr lang="en-US" dirty="0" err="1" smtClean="0"/>
-              <a:t>img</a:t>
-            </a:r>
-            <a:r>
-              <a:rPr lang="en-US" dirty="0" smtClean="0"/>
-              <a:t>, a</a:t>
-            </a:r>
-          </a:p>
-          <a:p>
-            <a:r>
-              <a:rPr lang="en-US" dirty="0" smtClean="0"/>
-              <a:t>Some tags require additional files</a:t>
+              <a:t>script, style, meta, </a:t>
+            </a:r>
+            <a:r>
+              <a:rPr lang="en-US" dirty="0" smtClean="0"/>
+              <a:t>link</a:t>
+            </a:r>
+          </a:p>
+          <a:p>
+            <a:r>
+              <a:rPr lang="en-US" dirty="0" smtClean="0"/>
+              <a:t>Some tags require additional files:</a:t>
             </a:r>
           </a:p>
           <a:p>
             <a:pPr lvl="1"/>
             <a:r>
               <a:rPr lang="en-US" dirty="0" smtClean="0"/>
-              <a:t>object, embed, applet</a:t>
+              <a:t>object</a:t>
+            </a:r>
+            <a:r>
+              <a:rPr lang="en-US" dirty="0" smtClean="0"/>
+              <a:t>, embed, applet</a:t>
             </a:r>
           </a:p>
           <a:p>
@@ -5377,22 +5158,25 @@
           <a:p>
             <a:r>
               <a:rPr lang="en-US" dirty="0" smtClean="0"/>
-              <a:t>Specifically unsupported tag </a:t>
-            </a:r>
-            <a:r>
-              <a:rPr lang="en-US" dirty="0" err="1" smtClean="0"/>
-              <a:t>subtrees</a:t>
-            </a:r>
-            <a:r>
-              <a:rPr lang="en-US" dirty="0" smtClean="0"/>
-              <a:t> are removed prior to analysis</a:t>
-            </a:r>
-          </a:p>
-          <a:p>
-            <a:r>
-              <a:rPr lang="en-US" dirty="0" smtClean="0"/>
-              <a:t>Attributes not yet supported*</a:t>
-            </a:r>
+              <a:t>Subtrees rooted at </a:t>
+            </a:r>
+            <a:r>
+              <a:rPr lang="en-US" dirty="0" smtClean="0"/>
+              <a:t>unsupported </a:t>
+            </a:r>
+            <a:r>
+              <a:rPr lang="en-US" dirty="0" smtClean="0"/>
+              <a:t>tags </a:t>
+            </a:r>
+            <a:r>
+              <a:rPr lang="en-US" dirty="0" smtClean="0"/>
+              <a:t>are removed prior to </a:t>
+            </a:r>
+            <a:r>
+              <a:rPr lang="en-US" dirty="0" smtClean="0"/>
+              <a:t>rule extraction</a:t>
+            </a:r>
+            <a:endParaRPr lang="en-US" dirty="0" smtClean="0"/>
           </a:p>
         </p:txBody>
       </p:sp>
@@ -5472,36 +5256,33 @@
             <p:ph idx="1"/>
           </p:nvPr>
         </p:nvSpPr>
-        <p:spPr/>
+        <p:spPr>
+          <a:xfrm>
+            <a:off x="457200" y="1600200"/>
+            <a:ext cx="7848600" cy="5257800"/>
+          </a:xfrm>
+        </p:spPr>
         <p:txBody>
           <a:bodyPr>
-            <a:normAutofit fontScale="92500" lnSpcReduction="10000"/>
+            <a:normAutofit lnSpcReduction="10000"/>
           </a:bodyPr>
           <a:lstStyle/>
           <a:p>
             <a:r>
               <a:rPr lang="en-US" dirty="0" smtClean="0"/>
-              <a:t>Obviously written in Python</a:t>
-            </a:r>
-          </a:p>
-          <a:p>
-            <a:r>
-              <a:rPr lang="en-US" dirty="0" smtClean="0"/>
-              <a:t>Two main steps:</a:t>
-            </a:r>
+              <a:t>Parser</a:t>
+            </a:r>
+            <a:endParaRPr lang="en-US" dirty="0" smtClean="0"/>
           </a:p>
           <a:p>
             <a:pPr lvl="1"/>
             <a:r>
               <a:rPr lang="en-US" dirty="0" smtClean="0"/>
-              <a:t>Parser</a:t>
-            </a:r>
-          </a:p>
-          <a:p>
-            <a:pPr lvl="2"/>
-            <a:r>
-              <a:rPr lang="en-US" dirty="0" smtClean="0"/>
-              <a:t>Removes unsupported </a:t>
+              <a:t>Removes </a:t>
+            </a:r>
+            <a:r>
+              <a:rPr lang="en-US" dirty="0" smtClean="0"/>
+              <a:t>specifically unsupported </a:t>
             </a:r>
             <a:r>
               <a:rPr lang="en-US" dirty="0" smtClean="0"/>
@@ -5509,47 +5290,112 @@
             </a:r>
           </a:p>
           <a:p>
-            <a:pPr lvl="2"/>
-            <a:r>
-              <a:rPr lang="en-US" dirty="0" smtClean="0"/>
-              <a:t>Parses the entire corpus and builds the full transition matrix</a:t>
-            </a:r>
-          </a:p>
-          <a:p>
-            <a:pPr lvl="2"/>
-            <a:r>
-              <a:rPr lang="en-US" dirty="0" smtClean="0"/>
-              <a:t>Makes no tag structure or grammar assumptions</a:t>
-            </a:r>
-          </a:p>
-          <a:p>
             <a:pPr lvl="1"/>
             <a:r>
               <a:rPr lang="en-US" dirty="0" smtClean="0"/>
+              <a:t>Parses the </a:t>
+            </a:r>
+            <a:r>
+              <a:rPr lang="en-US" dirty="0" smtClean="0"/>
+              <a:t>corpus </a:t>
+            </a:r>
+            <a:r>
+              <a:rPr lang="en-US" dirty="0" smtClean="0"/>
+              <a:t>and </a:t>
+            </a:r>
+            <a:r>
+              <a:rPr lang="en-US" dirty="0" smtClean="0"/>
+              <a:t>extracts a transition rule map</a:t>
+            </a:r>
+            <a:endParaRPr lang="en-US" dirty="0" smtClean="0"/>
+          </a:p>
+          <a:p>
+            <a:pPr lvl="1"/>
+            <a:r>
+              <a:rPr lang="en-US" dirty="0" smtClean="0"/>
+              <a:t>Makes no </a:t>
+            </a:r>
+            <a:r>
+              <a:rPr lang="en-US" dirty="0" smtClean="0"/>
+              <a:t>strict </a:t>
+            </a:r>
+            <a:r>
+              <a:rPr lang="en-US" dirty="0" smtClean="0"/>
+              <a:t>grammar assumptions</a:t>
+            </a:r>
+          </a:p>
+          <a:p>
+            <a:r>
+              <a:rPr lang="en-US" dirty="0" smtClean="0"/>
               <a:t>Generator</a:t>
             </a:r>
           </a:p>
           <a:p>
-            <a:pPr lvl="2"/>
-            <a:r>
-              <a:rPr lang="en-US" dirty="0" smtClean="0"/>
-              <a:t>Loads the transition matrix</a:t>
-            </a:r>
-          </a:p>
-          <a:p>
-            <a:pPr lvl="2"/>
-            <a:r>
-              <a:rPr lang="en-US" dirty="0" smtClean="0"/>
-              <a:t>Traverses the transition matrix as a Markov process</a:t>
-            </a:r>
-          </a:p>
-          <a:p>
-            <a:pPr lvl="2"/>
-            <a:r>
-              <a:rPr lang="en-US" dirty="0" smtClean="0"/>
-              <a:t>Writes the resulting HTML structure to a file</a:t>
-            </a:r>
-            <a:endParaRPr lang="en-US" dirty="0"/>
+            <a:pPr lvl="1"/>
+            <a:r>
+              <a:rPr lang="en-US" dirty="0" smtClean="0"/>
+              <a:t>Recursively traverses </a:t>
+            </a:r>
+            <a:r>
+              <a:rPr lang="en-US" dirty="0" smtClean="0"/>
+              <a:t>the transition </a:t>
+            </a:r>
+            <a:r>
+              <a:rPr lang="en-US" dirty="0" smtClean="0"/>
+              <a:t>rule map like </a:t>
+            </a:r>
+            <a:r>
+              <a:rPr lang="en-US" dirty="0" smtClean="0"/>
+              <a:t>a Markov </a:t>
+            </a:r>
+            <a:r>
+              <a:rPr lang="en-US" dirty="0" smtClean="0"/>
+              <a:t>process to stochastically build a tree of tags</a:t>
+            </a:r>
+            <a:endParaRPr lang="en-US" dirty="0" smtClean="0"/>
+          </a:p>
+          <a:p>
+            <a:pPr lvl="1"/>
+            <a:r>
+              <a:rPr lang="en-US" dirty="0" smtClean="0"/>
+              <a:t>Writes the </a:t>
+            </a:r>
+            <a:r>
+              <a:rPr lang="en-US" dirty="0" smtClean="0"/>
+              <a:t>generated HTML document to </a:t>
+            </a:r>
+            <a:r>
+              <a:rPr lang="en-US" dirty="0" smtClean="0"/>
+              <a:t>a </a:t>
+            </a:r>
+            <a:r>
+              <a:rPr lang="en-US" dirty="0" smtClean="0"/>
+              <a:t>file</a:t>
+            </a:r>
+          </a:p>
+          <a:p>
+            <a:r>
+              <a:rPr lang="en-US" dirty="0" smtClean="0"/>
+              <a:t>Surface renderer</a:t>
+            </a:r>
+          </a:p>
+          <a:p>
+            <a:pPr lvl="1"/>
+            <a:r>
+              <a:rPr lang="en-US" dirty="0" smtClean="0"/>
+              <a:t>Replaces “TEXT” with stochastically generated text</a:t>
+            </a:r>
+          </a:p>
+          <a:p>
+            <a:pPr lvl="1"/>
+            <a:r>
+              <a:rPr lang="en-US" dirty="0" smtClean="0"/>
+              <a:t>Rewrites </a:t>
+            </a:r>
+            <a:r>
+              <a:rPr lang="en-US" dirty="0" smtClean="0"/>
+              <a:t>file name attributes for links and images</a:t>
+            </a:r>
           </a:p>
         </p:txBody>
       </p:sp>

</xml_diff>